<commit_message>
Fiinal read through ch 3
</commit_message>
<xml_diff>
--- a/RawImageFiles/3-2-AOTFConfigurations.pptx
+++ b/RawImageFiles/3-2-AOTFConfigurations.pptx
@@ -304,7 +304,7 @@
           <a:p>
             <a:fld id="{B033C8DD-9AB1-4F04-B1BD-7AAB3A71C60C}" type="datetimeFigureOut">
               <a:rPr lang="en-CA" smtClean="0"/>
-              <a:t>10/09/2015</a:t>
+              <a:t>12/02/2016</a:t>
             </a:fld>
             <a:endParaRPr lang="en-CA"/>
           </a:p>
@@ -474,7 +474,7 @@
           <a:p>
             <a:fld id="{B033C8DD-9AB1-4F04-B1BD-7AAB3A71C60C}" type="datetimeFigureOut">
               <a:rPr lang="en-CA" smtClean="0"/>
-              <a:t>10/09/2015</a:t>
+              <a:t>12/02/2016</a:t>
             </a:fld>
             <a:endParaRPr lang="en-CA"/>
           </a:p>
@@ -654,7 +654,7 @@
           <a:p>
             <a:fld id="{B033C8DD-9AB1-4F04-B1BD-7AAB3A71C60C}" type="datetimeFigureOut">
               <a:rPr lang="en-CA" smtClean="0"/>
-              <a:t>10/09/2015</a:t>
+              <a:t>12/02/2016</a:t>
             </a:fld>
             <a:endParaRPr lang="en-CA"/>
           </a:p>
@@ -824,7 +824,7 @@
           <a:p>
             <a:fld id="{B033C8DD-9AB1-4F04-B1BD-7AAB3A71C60C}" type="datetimeFigureOut">
               <a:rPr lang="en-CA" smtClean="0"/>
-              <a:t>10/09/2015</a:t>
+              <a:t>12/02/2016</a:t>
             </a:fld>
             <a:endParaRPr lang="en-CA"/>
           </a:p>
@@ -1070,7 +1070,7 @@
           <a:p>
             <a:fld id="{B033C8DD-9AB1-4F04-B1BD-7AAB3A71C60C}" type="datetimeFigureOut">
               <a:rPr lang="en-CA" smtClean="0"/>
-              <a:t>10/09/2015</a:t>
+              <a:t>12/02/2016</a:t>
             </a:fld>
             <a:endParaRPr lang="en-CA"/>
           </a:p>
@@ -1358,7 +1358,7 @@
           <a:p>
             <a:fld id="{B033C8DD-9AB1-4F04-B1BD-7AAB3A71C60C}" type="datetimeFigureOut">
               <a:rPr lang="en-CA" smtClean="0"/>
-              <a:t>10/09/2015</a:t>
+              <a:t>12/02/2016</a:t>
             </a:fld>
             <a:endParaRPr lang="en-CA"/>
           </a:p>
@@ -1785,7 +1785,7 @@
           <a:p>
             <a:fld id="{B033C8DD-9AB1-4F04-B1BD-7AAB3A71C60C}" type="datetimeFigureOut">
               <a:rPr lang="en-CA" smtClean="0"/>
-              <a:t>10/09/2015</a:t>
+              <a:t>12/02/2016</a:t>
             </a:fld>
             <a:endParaRPr lang="en-CA"/>
           </a:p>
@@ -1903,7 +1903,7 @@
           <a:p>
             <a:fld id="{B033C8DD-9AB1-4F04-B1BD-7AAB3A71C60C}" type="datetimeFigureOut">
               <a:rPr lang="en-CA" smtClean="0"/>
-              <a:t>10/09/2015</a:t>
+              <a:t>12/02/2016</a:t>
             </a:fld>
             <a:endParaRPr lang="en-CA"/>
           </a:p>
@@ -1998,7 +1998,7 @@
           <a:p>
             <a:fld id="{B033C8DD-9AB1-4F04-B1BD-7AAB3A71C60C}" type="datetimeFigureOut">
               <a:rPr lang="en-CA" smtClean="0"/>
-              <a:t>10/09/2015</a:t>
+              <a:t>12/02/2016</a:t>
             </a:fld>
             <a:endParaRPr lang="en-CA"/>
           </a:p>
@@ -2275,7 +2275,7 @@
           <a:p>
             <a:fld id="{B033C8DD-9AB1-4F04-B1BD-7AAB3A71C60C}" type="datetimeFigureOut">
               <a:rPr lang="en-CA" smtClean="0"/>
-              <a:t>10/09/2015</a:t>
+              <a:t>12/02/2016</a:t>
             </a:fld>
             <a:endParaRPr lang="en-CA"/>
           </a:p>
@@ -2528,7 +2528,7 @@
           <a:p>
             <a:fld id="{B033C8DD-9AB1-4F04-B1BD-7AAB3A71C60C}" type="datetimeFigureOut">
               <a:rPr lang="en-CA" smtClean="0"/>
-              <a:t>10/09/2015</a:t>
+              <a:t>12/02/2016</a:t>
             </a:fld>
             <a:endParaRPr lang="en-CA"/>
           </a:p>
@@ -2741,7 +2741,7 @@
           <a:p>
             <a:fld id="{B033C8DD-9AB1-4F04-B1BD-7AAB3A71C60C}" type="datetimeFigureOut">
               <a:rPr lang="en-CA" smtClean="0"/>
-              <a:t>10/09/2015</a:t>
+              <a:t>12/02/2016</a:t>
             </a:fld>
             <a:endParaRPr lang="en-CA"/>
           </a:p>
@@ -3290,7 +3290,7 @@
         <p:spPr>
           <a:xfrm>
             <a:off x="801316" y="1175625"/>
-            <a:ext cx="1860509" cy="369332"/>
+            <a:ext cx="1546257" cy="369332"/>
           </a:xfrm>
           <a:prstGeom prst="rect">
             <a:avLst/>
@@ -3304,8 +3304,8 @@
           <a:lstStyle/>
           <a:p>
             <a:r>
-              <a:rPr lang="en-CA" dirty="0"/>
-              <a:t>Standing RF Wave</a:t>
+              <a:rPr lang="en-CA" dirty="0" smtClean="0"/>
+              <a:t>Acoustic Wave</a:t>
             </a:r>
             <a:endParaRPr lang="en-CA" dirty="0"/>
           </a:p>
@@ -3337,7 +3337,6 @@
               <a:rPr lang="en-CA" dirty="0"/>
               <a:t>First Order (o)</a:t>
             </a:r>
-            <a:endParaRPr lang="en-CA" dirty="0"/>
           </a:p>
         </p:txBody>
       </p:sp>
@@ -3367,7 +3366,6 @@
               <a:rPr lang="en-CA" dirty="0"/>
               <a:t>Zeroth Order (o)</a:t>
             </a:r>
-            <a:endParaRPr lang="en-CA" dirty="0"/>
           </a:p>
         </p:txBody>
       </p:sp>
@@ -3397,7 +3395,6 @@
               <a:rPr lang="en-CA" dirty="0"/>
               <a:t>Zeroth Order (e)</a:t>
             </a:r>
-            <a:endParaRPr lang="en-CA" dirty="0"/>
           </a:p>
         </p:txBody>
       </p:sp>
@@ -3427,7 +3424,6 @@
               <a:rPr lang="en-CA" dirty="0"/>
               <a:t>First Order (e)</a:t>
             </a:r>
-            <a:endParaRPr lang="en-CA" dirty="0"/>
           </a:p>
         </p:txBody>
       </p:sp>
@@ -3971,7 +3967,7 @@
         <p:spPr>
           <a:xfrm>
             <a:off x="780513" y="2978671"/>
-            <a:ext cx="1860509" cy="369332"/>
+            <a:ext cx="1546257" cy="369332"/>
           </a:xfrm>
           <a:prstGeom prst="rect">
             <a:avLst/>
@@ -3985,10 +3981,13 @@
           <a:lstStyle/>
           <a:p>
             <a:r>
+              <a:rPr lang="en-CA" dirty="0" smtClean="0"/>
+              <a:t>Acoustic </a:t>
+            </a:r>
+            <a:r>
               <a:rPr lang="en-CA" dirty="0"/>
-              <a:t>Standing RF Wave</a:t>
-            </a:r>
-            <a:endParaRPr lang="en-CA" dirty="0"/>
+              <a:t>Wave</a:t>
+            </a:r>
           </a:p>
         </p:txBody>
       </p:sp>
@@ -4018,7 +4017,6 @@
               <a:rPr lang="en-CA" dirty="0"/>
               <a:t>First Order (o)</a:t>
             </a:r>
-            <a:endParaRPr lang="en-CA" dirty="0"/>
           </a:p>
         </p:txBody>
       </p:sp>
@@ -4048,7 +4046,6 @@
               <a:rPr lang="en-CA" dirty="0"/>
               <a:t>Zeroth Order (o)</a:t>
             </a:r>
-            <a:endParaRPr lang="en-CA" dirty="0"/>
           </a:p>
         </p:txBody>
       </p:sp>
@@ -4078,7 +4075,6 @@
               <a:rPr lang="en-CA" dirty="0"/>
               <a:t>Zeroth Order (e)</a:t>
             </a:r>
-            <a:endParaRPr lang="en-CA" dirty="0"/>
           </a:p>
         </p:txBody>
       </p:sp>
@@ -4108,7 +4104,6 @@
               <a:rPr lang="en-CA" dirty="0"/>
               <a:t>First Order (e)</a:t>
             </a:r>
-            <a:endParaRPr lang="en-CA" dirty="0"/>
           </a:p>
         </p:txBody>
       </p:sp>
@@ -4621,7 +4616,7 @@
         <p:spPr>
           <a:xfrm>
             <a:off x="657560" y="4681847"/>
-            <a:ext cx="2184316" cy="369332"/>
+            <a:ext cx="1870064" cy="369332"/>
           </a:xfrm>
           <a:prstGeom prst="rect">
             <a:avLst/>
@@ -4635,12 +4630,12 @@
           <a:lstStyle/>
           <a:p>
             <a:r>
-              <a:rPr lang="en-CA" dirty="0" smtClean="0"/>
-              <a:t>No Standing </a:t>
-            </a:r>
-            <a:r>
-              <a:rPr lang="en-CA" dirty="0"/>
-              <a:t>RF Wave</a:t>
+              <a:rPr lang="en-CA" smtClean="0"/>
+              <a:t>No </a:t>
+            </a:r>
+            <a:r>
+              <a:rPr lang="en-CA" smtClean="0"/>
+              <a:t>Acoustic Wave</a:t>
             </a:r>
             <a:endParaRPr lang="en-CA" dirty="0"/>
           </a:p>
@@ -4672,7 +4667,6 @@
               <a:rPr lang="en-CA" dirty="0"/>
               <a:t>Zeroth Order (o)</a:t>
             </a:r>
-            <a:endParaRPr lang="en-CA" dirty="0"/>
           </a:p>
         </p:txBody>
       </p:sp>
@@ -4702,7 +4696,6 @@
               <a:rPr lang="en-CA" dirty="0"/>
               <a:t>Zeroth Order (e)</a:t>
             </a:r>
-            <a:endParaRPr lang="en-CA" dirty="0"/>
           </a:p>
         </p:txBody>
       </p:sp>

</xml_diff>